<commit_message>
minor addition to Exercise
</commit_message>
<xml_diff>
--- a/doc/slides/day3/session3/Parallelization.pptx
+++ b/doc/slides/day3/session3/Parallelization.pptx
@@ -5,23 +5,24 @@
     <p:sldMasterId id="2147483648" r:id="rId1"/>
   </p:sldMasterIdLst>
   <p:notesMasterIdLst>
-    <p:notesMasterId r:id="rId16"/>
+    <p:notesMasterId r:id="rId17"/>
   </p:notesMasterIdLst>
   <p:sldIdLst>
     <p:sldId id="256" r:id="rId2"/>
     <p:sldId id="257" r:id="rId3"/>
     <p:sldId id="258" r:id="rId4"/>
-    <p:sldId id="259" r:id="rId5"/>
-    <p:sldId id="263" r:id="rId6"/>
-    <p:sldId id="262" r:id="rId7"/>
-    <p:sldId id="260" r:id="rId8"/>
-    <p:sldId id="261" r:id="rId9"/>
-    <p:sldId id="264" r:id="rId10"/>
-    <p:sldId id="265" r:id="rId11"/>
-    <p:sldId id="266" r:id="rId12"/>
-    <p:sldId id="267" r:id="rId13"/>
-    <p:sldId id="269" r:id="rId14"/>
-    <p:sldId id="268" r:id="rId15"/>
+    <p:sldId id="270" r:id="rId5"/>
+    <p:sldId id="259" r:id="rId6"/>
+    <p:sldId id="263" r:id="rId7"/>
+    <p:sldId id="262" r:id="rId8"/>
+    <p:sldId id="260" r:id="rId9"/>
+    <p:sldId id="261" r:id="rId10"/>
+    <p:sldId id="264" r:id="rId11"/>
+    <p:sldId id="265" r:id="rId12"/>
+    <p:sldId id="266" r:id="rId13"/>
+    <p:sldId id="267" r:id="rId14"/>
+    <p:sldId id="269" r:id="rId15"/>
+    <p:sldId id="268" r:id="rId16"/>
   </p:sldIdLst>
   <p:sldSz cx="9144000" cy="6858000" type="screen4x3"/>
   <p:notesSz cx="6858000" cy="9144000"/>
@@ -206,7 +207,7 @@
             <a:fld id="{AA22FD29-94C2-024B-A6DB-DDD6B63A2E89}" type="datetimeFigureOut">
               <a:rPr lang="en-US" smtClean="0"/>
               <a:pPr/>
-              <a:t>9/3/12</a:t>
+              <a:t>9/9/12</a:t>
             </a:fld>
             <a:endParaRPr lang="en-US"/>
           </a:p>
@@ -768,7 +769,7 @@
             <a:fld id="{E1C771E1-65AF-DB4F-8DBC-7DF996E51DDF}" type="datetimeFigureOut">
               <a:rPr lang="en-US" smtClean="0"/>
               <a:pPr/>
-              <a:t>9/3/12</a:t>
+              <a:t>9/9/12</a:t>
             </a:fld>
             <a:endParaRPr lang="en-US"/>
           </a:p>
@@ -935,7 +936,7 @@
             <a:fld id="{E1C771E1-65AF-DB4F-8DBC-7DF996E51DDF}" type="datetimeFigureOut">
               <a:rPr lang="en-US" smtClean="0"/>
               <a:pPr/>
-              <a:t>9/3/12</a:t>
+              <a:t>9/9/12</a:t>
             </a:fld>
             <a:endParaRPr lang="en-US"/>
           </a:p>
@@ -1112,7 +1113,7 @@
             <a:fld id="{E1C771E1-65AF-DB4F-8DBC-7DF996E51DDF}" type="datetimeFigureOut">
               <a:rPr lang="en-US" smtClean="0"/>
               <a:pPr/>
-              <a:t>9/3/12</a:t>
+              <a:t>9/9/12</a:t>
             </a:fld>
             <a:endParaRPr lang="en-US"/>
           </a:p>
@@ -1279,7 +1280,7 @@
             <a:fld id="{E1C771E1-65AF-DB4F-8DBC-7DF996E51DDF}" type="datetimeFigureOut">
               <a:rPr lang="en-US" smtClean="0"/>
               <a:pPr/>
-              <a:t>9/3/12</a:t>
+              <a:t>9/9/12</a:t>
             </a:fld>
             <a:endParaRPr lang="en-US"/>
           </a:p>
@@ -1522,7 +1523,7 @@
             <a:fld id="{E1C771E1-65AF-DB4F-8DBC-7DF996E51DDF}" type="datetimeFigureOut">
               <a:rPr lang="en-US" smtClean="0"/>
               <a:pPr/>
-              <a:t>9/3/12</a:t>
+              <a:t>9/9/12</a:t>
             </a:fld>
             <a:endParaRPr lang="en-US"/>
           </a:p>
@@ -1807,7 +1808,7 @@
             <a:fld id="{E1C771E1-65AF-DB4F-8DBC-7DF996E51DDF}" type="datetimeFigureOut">
               <a:rPr lang="en-US" smtClean="0"/>
               <a:pPr/>
-              <a:t>9/3/12</a:t>
+              <a:t>9/9/12</a:t>
             </a:fld>
             <a:endParaRPr lang="en-US"/>
           </a:p>
@@ -2226,7 +2227,7 @@
             <a:fld id="{E1C771E1-65AF-DB4F-8DBC-7DF996E51DDF}" type="datetimeFigureOut">
               <a:rPr lang="en-US" smtClean="0"/>
               <a:pPr/>
-              <a:t>9/3/12</a:t>
+              <a:t>9/9/12</a:t>
             </a:fld>
             <a:endParaRPr lang="en-US"/>
           </a:p>
@@ -2341,7 +2342,7 @@
             <a:fld id="{E1C771E1-65AF-DB4F-8DBC-7DF996E51DDF}" type="datetimeFigureOut">
               <a:rPr lang="en-US" smtClean="0"/>
               <a:pPr/>
-              <a:t>9/3/12</a:t>
+              <a:t>9/9/12</a:t>
             </a:fld>
             <a:endParaRPr lang="en-US"/>
           </a:p>
@@ -2433,7 +2434,7 @@
             <a:fld id="{E1C771E1-65AF-DB4F-8DBC-7DF996E51DDF}" type="datetimeFigureOut">
               <a:rPr lang="en-US" smtClean="0"/>
               <a:pPr/>
-              <a:t>9/3/12</a:t>
+              <a:t>9/9/12</a:t>
             </a:fld>
             <a:endParaRPr lang="en-US"/>
           </a:p>
@@ -2707,7 +2708,7 @@
             <a:fld id="{E1C771E1-65AF-DB4F-8DBC-7DF996E51DDF}" type="datetimeFigureOut">
               <a:rPr lang="en-US" smtClean="0"/>
               <a:pPr/>
-              <a:t>9/3/12</a:t>
+              <a:t>9/9/12</a:t>
             </a:fld>
             <a:endParaRPr lang="en-US"/>
           </a:p>
@@ -2957,7 +2958,7 @@
             <a:fld id="{E1C771E1-65AF-DB4F-8DBC-7DF996E51DDF}" type="datetimeFigureOut">
               <a:rPr lang="en-US" smtClean="0"/>
               <a:pPr/>
-              <a:t>9/3/12</a:t>
+              <a:t>9/9/12</a:t>
             </a:fld>
             <a:endParaRPr lang="en-US"/>
           </a:p>
@@ -3167,7 +3168,7 @@
             <a:fld id="{E1C771E1-65AF-DB4F-8DBC-7DF996E51DDF}" type="datetimeFigureOut">
               <a:rPr lang="en-US" smtClean="0"/>
               <a:pPr/>
-              <a:t>9/3/12</a:t>
+              <a:t>9/9/12</a:t>
             </a:fld>
             <a:endParaRPr lang="en-US"/>
           </a:p>
@@ -3626,7 +3627,7 @@
           <a:p>
             <a:r>
               <a:rPr lang="en-US" dirty="0" smtClean="0"/>
-              <a:t>Web services</a:t>
+              <a:t>CORBA/COM</a:t>
             </a:r>
             <a:endParaRPr lang="en-US" dirty="0"/>
           </a:p>
@@ -3693,7 +3694,7 @@
           <a:p>
             <a:r>
               <a:rPr lang="en-US" dirty="0" smtClean="0"/>
-              <a:t>Grids</a:t>
+              <a:t>Web services</a:t>
             </a:r>
             <a:endParaRPr lang="en-US" dirty="0"/>
           </a:p>
@@ -3760,7 +3761,7 @@
           <a:p>
             <a:r>
               <a:rPr lang="en-US" dirty="0" smtClean="0"/>
-              <a:t>Condor</a:t>
+              <a:t>Grids</a:t>
             </a:r>
             <a:endParaRPr lang="en-US" dirty="0"/>
           </a:p>
@@ -3827,17 +3828,9 @@
           <a:p>
             <a:r>
               <a:rPr lang="en-US" dirty="0" smtClean="0"/>
-              <a:t>Example: </a:t>
-            </a:r>
-            <a:r>
-              <a:rPr lang="en-US" dirty="0" err="1" smtClean="0"/>
-              <a:t>mycorrhiza</a:t>
-            </a:r>
-            <a:r>
-              <a:rPr lang="en-US" smtClean="0"/>
-              <a:t> pipeline</a:t>
-            </a:r>
-            <a:endParaRPr lang="en-US"/>
+              <a:t>Condor</a:t>
+            </a:r>
+            <a:endParaRPr lang="en-US" dirty="0"/>
           </a:p>
         </p:txBody>
       </p:sp>
@@ -3897,6 +3890,134 @@
         </p:nvSpPr>
         <p:spPr/>
         <p:txBody>
+          <a:bodyPr>
+            <a:normAutofit fontScale="90000"/>
+          </a:bodyPr>
+          <a:lstStyle/>
+          <a:p>
+            <a:r>
+              <a:rPr lang="en-US" dirty="0" smtClean="0"/>
+              <a:t>Exercise: </a:t>
+            </a:r>
+            <a:r>
+              <a:rPr lang="en-US" dirty="0" smtClean="0"/>
+              <a:t>Parallelize Plasmodium Alignment</a:t>
+            </a:r>
+            <a:endParaRPr lang="en-US" dirty="0"/>
+          </a:p>
+        </p:txBody>
+      </p:sp>
+      <p:sp>
+        <p:nvSpPr>
+          <p:cNvPr id="3" name="Content Placeholder 2"/>
+          <p:cNvSpPr>
+            <a:spLocks noGrp="1"/>
+          </p:cNvSpPr>
+          <p:nvPr>
+            <p:ph idx="1"/>
+          </p:nvPr>
+        </p:nvSpPr>
+        <p:spPr/>
+        <p:txBody>
+          <a:bodyPr/>
+          <a:lstStyle/>
+          <a:p>
+            <a:r>
+              <a:rPr lang="en-US" dirty="0" smtClean="0"/>
+              <a:t>Write a </a:t>
+            </a:r>
+            <a:r>
+              <a:rPr lang="en-US" dirty="0" err="1" smtClean="0"/>
+              <a:t>perl</a:t>
+            </a:r>
+            <a:r>
+              <a:rPr lang="en-US" dirty="0" smtClean="0"/>
+              <a:t> process using fork or Threads to align the Pair </a:t>
+            </a:r>
+            <a:r>
+              <a:rPr lang="en-US" dirty="0" err="1" smtClean="0"/>
+              <a:t>fastq</a:t>
+            </a:r>
+            <a:r>
+              <a:rPr lang="en-US" dirty="0" smtClean="0"/>
+              <a:t> files to SAI files in parallel, before producing the bam file with </a:t>
+            </a:r>
+            <a:r>
+              <a:rPr lang="en-US" dirty="0" err="1" smtClean="0"/>
+              <a:t>sampe</a:t>
+            </a:r>
+            <a:r>
+              <a:rPr lang="en-US" dirty="0" smtClean="0"/>
+              <a:t> if, and only if, both SAI forks/threads </a:t>
+            </a:r>
+            <a:r>
+              <a:rPr lang="en-US" smtClean="0"/>
+              <a:t>run successfully</a:t>
+            </a:r>
+            <a:endParaRPr lang="en-US" dirty="0" smtClean="0"/>
+          </a:p>
+          <a:p>
+            <a:r>
+              <a:rPr lang="en-US" dirty="0" smtClean="0"/>
+              <a:t>Run the Plasmodium </a:t>
+            </a:r>
+            <a:r>
+              <a:rPr lang="en-US" dirty="0" err="1" smtClean="0"/>
+              <a:t>Makefile</a:t>
+            </a:r>
+            <a:r>
+              <a:rPr lang="en-US" dirty="0" smtClean="0"/>
+              <a:t> with 2 threads so that it produces SAI files in parallel before producing the </a:t>
+            </a:r>
+            <a:r>
+              <a:rPr lang="en-US" dirty="0" err="1" smtClean="0"/>
+              <a:t>sampe</a:t>
+            </a:r>
+            <a:r>
+              <a:rPr lang="en-US" dirty="0" smtClean="0"/>
+              <a:t> file </a:t>
+            </a:r>
+            <a:endParaRPr lang="en-US" dirty="0"/>
+          </a:p>
+        </p:txBody>
+      </p:sp>
+    </p:spTree>
+  </p:cSld>
+  <p:clrMapOvr>
+    <a:masterClrMapping/>
+  </p:clrMapOvr>
+</p:sld>
+</file>
+
+<file path=ppt/slides/slide15.xml><?xml version="1.0" encoding="utf-8"?>
+<p:sld xmlns:a="http://schemas.openxmlformats.org/drawingml/2006/main" xmlns:r="http://schemas.openxmlformats.org/officeDocument/2006/relationships" xmlns:mc="http://schemas.openxmlformats.org/markup-compatibility/2006" xmlns:mv="urn:schemas-microsoft-com:mac:vml" xmlns:p="http://schemas.openxmlformats.org/presentationml/2006/main" mc:Ignorable="mv" mc:PreserveAttributes="mv:*">
+  <p:cSld>
+    <p:spTree>
+      <p:nvGrpSpPr>
+        <p:cNvPr id="1" name=""/>
+        <p:cNvGrpSpPr/>
+        <p:nvPr/>
+      </p:nvGrpSpPr>
+      <p:grpSpPr>
+        <a:xfrm>
+          <a:off x="0" y="0"/>
+          <a:ext cx="0" cy="0"/>
+          <a:chOff x="0" y="0"/>
+          <a:chExt cx="0" cy="0"/>
+        </a:xfrm>
+      </p:grpSpPr>
+      <p:sp>
+        <p:nvSpPr>
+          <p:cNvPr id="2" name="Title 1"/>
+          <p:cNvSpPr>
+            <a:spLocks noGrp="1"/>
+          </p:cNvSpPr>
+          <p:nvPr>
+            <p:ph type="title"/>
+          </p:nvPr>
+        </p:nvSpPr>
+        <p:spPr/>
+        <p:txBody>
           <a:bodyPr/>
           <a:lstStyle/>
           <a:p>
@@ -4103,7 +4224,7 @@
           <a:p>
             <a:r>
               <a:rPr lang="en-US" dirty="0" smtClean="0"/>
-              <a:t>Parallel make</a:t>
+              <a:t>Fork/Threads</a:t>
             </a:r>
             <a:endParaRPr lang="en-US" dirty="0"/>
           </a:p>
@@ -4170,7 +4291,7 @@
           <a:p>
             <a:r>
               <a:rPr lang="en-US" dirty="0" smtClean="0"/>
-              <a:t>GPU</a:t>
+              <a:t>Parallel make</a:t>
             </a:r>
             <a:endParaRPr lang="en-US" dirty="0"/>
           </a:p>
@@ -4237,7 +4358,7 @@
           <a:p>
             <a:r>
               <a:rPr lang="en-US" dirty="0" smtClean="0"/>
-              <a:t>Clusters</a:t>
+              <a:t>GPU</a:t>
             </a:r>
             <a:endParaRPr lang="en-US" dirty="0"/>
           </a:p>
@@ -4304,7 +4425,7 @@
           <a:p>
             <a:r>
               <a:rPr lang="en-US" dirty="0" smtClean="0"/>
-              <a:t>Message-passing parallelization</a:t>
+              <a:t>Clusters</a:t>
             </a:r>
             <a:endParaRPr lang="en-US" dirty="0"/>
           </a:p>
@@ -4371,7 +4492,7 @@
           <a:p>
             <a:r>
               <a:rPr lang="en-US" dirty="0" smtClean="0"/>
-              <a:t>MPI</a:t>
+              <a:t>Message-passing parallelization</a:t>
             </a:r>
             <a:endParaRPr lang="en-US" dirty="0"/>
           </a:p>
@@ -4438,7 +4559,7 @@
           <a:p>
             <a:r>
               <a:rPr lang="en-US" dirty="0" smtClean="0"/>
-              <a:t>CORBA/COM</a:t>
+              <a:t>MPI</a:t>
             </a:r>
             <a:endParaRPr lang="en-US" dirty="0"/>
           </a:p>

</xml_diff>

<commit_message>
finished (?) slides for day3
</commit_message>
<xml_diff>
--- a/doc/slides/day3/session3/Parallelization.pptx
+++ b/doc/slides/day3/session3/Parallelization.pptx
@@ -3670,7 +3670,6 @@
               <a:rPr lang="en-US" dirty="0" smtClean="0"/>
               <a:t>Relatively cheap</a:t>
             </a:r>
-            <a:endParaRPr lang="en-US" dirty="0" smtClean="0"/>
           </a:p>
           <a:p>
             <a:r>
@@ -3839,11 +3838,7 @@
           <a:p>
             <a:r>
               <a:rPr lang="en-US" dirty="0" smtClean="0"/>
-              <a:t>Standard protocol ("message passing interface") implemented by multiple </a:t>
-            </a:r>
-            <a:r>
-              <a:rPr lang="en-US" dirty="0" smtClean="0"/>
-              <a:t>libraries</a:t>
+              <a:t>Standard protocol ("message passing interface") implemented by multiple libraries</a:t>
             </a:r>
           </a:p>
           <a:p>
@@ -3866,23 +3861,14 @@
           <a:p>
             <a:r>
               <a:rPr lang="en-US" dirty="0" smtClean="0"/>
-              <a:t>Can grow </a:t>
-            </a:r>
-            <a:r>
-              <a:rPr lang="en-US" dirty="0" smtClean="0"/>
-              <a:t>the cluster over time, add more "nodes"</a:t>
-            </a:r>
-          </a:p>
-          <a:p>
-            <a:r>
-              <a:rPr lang="en-US" dirty="0" smtClean="0"/>
-              <a:t>Network</a:t>
-            </a:r>
-            <a:r>
-              <a:rPr lang="en-US" dirty="0" smtClean="0"/>
-              <a:t> latency is a bottleneck</a:t>
-            </a:r>
-            <a:endParaRPr lang="en-US" dirty="0" smtClean="0"/>
+              <a:t>Can grow the cluster over time, add more "nodes"</a:t>
+            </a:r>
+          </a:p>
+          <a:p>
+            <a:r>
+              <a:rPr lang="en-US" dirty="0" smtClean="0"/>
+              <a:t>Network latency is a bottleneck</a:t>
+            </a:r>
           </a:p>
           <a:p>
             <a:endParaRPr lang="en-US" dirty="0"/>
@@ -3974,19 +3960,8 @@
                 <a:latin typeface="Courier New"/>
                 <a:cs typeface="Courier New"/>
               </a:rPr>
-              <a:t>use </a:t>
-            </a:r>
-            <a:r>
-              <a:rPr lang="en-US" b="1" dirty="0" smtClean="0">
-                <a:latin typeface="Courier New"/>
-                <a:cs typeface="Courier New"/>
-              </a:rPr>
-              <a:t>strict;</a:t>
-            </a:r>
-            <a:endParaRPr lang="en-US" b="1" dirty="0" smtClean="0">
-              <a:latin typeface="Courier New"/>
-              <a:cs typeface="Courier New"/>
-            </a:endParaRPr>
+              <a:t>use strict;</a:t>
+            </a:r>
           </a:p>
           <a:p>
             <a:pPr>
@@ -4013,10 +3988,6 @@
               </a:rPr>
               <a:t>;</a:t>
             </a:r>
-            <a:endParaRPr lang="en-US" b="1" dirty="0" smtClean="0">
-              <a:latin typeface="Courier New"/>
-              <a:cs typeface="Courier New"/>
-            </a:endParaRPr>
           </a:p>
           <a:p>
             <a:pPr>
@@ -4062,10 +4033,6 @@
               </a:rPr>
               <a:t>);</a:t>
             </a:r>
-            <a:endParaRPr lang="en-US" b="1" dirty="0" smtClean="0">
-              <a:latin typeface="Courier New"/>
-              <a:cs typeface="Courier New"/>
-            </a:endParaRPr>
           </a:p>
           <a:p>
             <a:pPr>
@@ -4076,14 +4043,7 @@
                 <a:latin typeface="Courier New"/>
                 <a:cs typeface="Courier New"/>
               </a:rPr>
-              <a:t>if </a:t>
-            </a:r>
-            <a:r>
-              <a:rPr lang="en-US" b="1" dirty="0" smtClean="0">
-                <a:latin typeface="Courier New"/>
-                <a:cs typeface="Courier New"/>
-              </a:rPr>
-              <a:t>($rank &gt; 0) {</a:t>
+              <a:t>if ($rank &gt; 0) {</a:t>
             </a:r>
           </a:p>
           <a:p>
@@ -4149,10 +4109,6 @@
               </a:rPr>
               <a:t>}</a:t>
             </a:r>
-            <a:endParaRPr lang="en-US" b="1" dirty="0" smtClean="0">
-              <a:latin typeface="Courier New"/>
-              <a:cs typeface="Courier New"/>
-            </a:endParaRPr>
           </a:p>
           <a:p>
             <a:pPr>
@@ -4163,14 +4119,7 @@
                 <a:latin typeface="Courier New"/>
                 <a:cs typeface="Courier New"/>
               </a:rPr>
-              <a:t>else </a:t>
-            </a:r>
-            <a:r>
-              <a:rPr lang="en-US" b="1" dirty="0" smtClean="0">
-                <a:latin typeface="Courier New"/>
-                <a:cs typeface="Courier New"/>
-              </a:rPr>
-              <a:t>{</a:t>
+              <a:t>else {</a:t>
             </a:r>
           </a:p>
           <a:p>
@@ -4478,11 +4427,7 @@
           <a:p>
             <a:r>
               <a:rPr lang="en-US" dirty="0" smtClean="0"/>
-              <a:t>SOAP web </a:t>
-            </a:r>
-            <a:r>
-              <a:rPr lang="en-US" dirty="0" smtClean="0"/>
-              <a:t>services</a:t>
+              <a:t>SOAP web services</a:t>
             </a:r>
             <a:endParaRPr lang="en-US" dirty="0"/>
           </a:p>
@@ -4737,11 +4682,7 @@
           <a:p>
             <a:r>
               <a:rPr lang="en-US" dirty="0" smtClean="0"/>
-              <a:t>Like a cluster, but </a:t>
-            </a:r>
-            <a:r>
-              <a:rPr lang="en-US" dirty="0" smtClean="0"/>
-              <a:t>more distributed, e.g. "national grids"</a:t>
+              <a:t>Like a cluster, but more distributed, e.g. "national grids"</a:t>
             </a:r>
           </a:p>
           <a:p>
@@ -4843,7 +4784,11 @@
           <a:p>
             <a:r>
               <a:rPr lang="en-US" dirty="0" smtClean="0"/>
-              <a:t>Can be used to leverage "sleeping" desktops, e.g. in an institution</a:t>
+              <a:t>Can be used to leverage "sleeping" desktops, e.g. in an </a:t>
+            </a:r>
+            <a:r>
+              <a:rPr lang="en-US" dirty="0" smtClean="0"/>
+              <a:t>institution ("CPU scavenging")</a:t>
             </a:r>
           </a:p>
           <a:p>
@@ -4934,11 +4879,7 @@
             </a:r>
             <a:r>
               <a:rPr lang="en-US" dirty="0" smtClean="0"/>
-              <a:t> </a:t>
-            </a:r>
-            <a:r>
-              <a:rPr lang="en-US" dirty="0" smtClean="0"/>
-              <a:t>&lt;</a:t>
+              <a:t> &lt;</a:t>
             </a:r>
             <a:r>
               <a:rPr lang="en-US" dirty="0" err="1" smtClean="0"/>
@@ -4948,7 +4889,6 @@
               <a:rPr lang="en-US" dirty="0" smtClean="0"/>
               <a:t>&gt; flag</a:t>
             </a:r>
-            <a:endParaRPr lang="en-US" dirty="0" smtClean="0"/>
           </a:p>
           <a:p>
             <a:r>
@@ -5171,11 +5111,7 @@
           <a:p>
             <a:r>
               <a:rPr lang="en-US" dirty="0" smtClean="0"/>
-              <a:t>Run </a:t>
-            </a:r>
-            <a:r>
-              <a:rPr lang="en-US" dirty="0" smtClean="0"/>
-              <a:t>the Plasmodium </a:t>
+              <a:t>Run the Plasmodium </a:t>
             </a:r>
             <a:r>
               <a:rPr lang="en-US" dirty="0" err="1" smtClean="0"/>
@@ -5191,7 +5127,35 @@
             </a:r>
             <a:r>
               <a:rPr lang="en-US" dirty="0" smtClean="0"/>
-              <a:t> file </a:t>
+              <a:t> file</a:t>
+            </a:r>
+            <a:r>
+              <a:rPr lang="en-US" dirty="0" smtClean="0"/>
+              <a:t> </a:t>
+            </a:r>
+          </a:p>
+          <a:p>
+            <a:r>
+              <a:rPr lang="en-US" dirty="0" smtClean="0"/>
+              <a:t>How much faster is the parallel invocation?</a:t>
+            </a:r>
+          </a:p>
+          <a:p>
+            <a:r>
+              <a:rPr lang="en-US" smtClean="0"/>
+              <a:t>When does </a:t>
+            </a:r>
+            <a:r>
+              <a:rPr lang="en-US" dirty="0" smtClean="0"/>
+              <a:t>parallelization not work in </a:t>
+            </a:r>
+            <a:r>
+              <a:rPr lang="en-US" dirty="0" err="1" smtClean="0"/>
+              <a:t>Makefiles</a:t>
+            </a:r>
+            <a:r>
+              <a:rPr lang="en-US" dirty="0" smtClean="0"/>
+              <a:t>?</a:t>
             </a:r>
             <a:endParaRPr lang="en-US" dirty="0"/>
           </a:p>
@@ -5234,12 +5198,22 @@
         </p:nvSpPr>
         <p:spPr/>
         <p:txBody>
-          <a:bodyPr/>
-          <a:lstStyle/>
-          <a:p>
-            <a:r>
-              <a:rPr lang="en-US" dirty="0" smtClean="0"/>
-              <a:t>Moore’s law and genomics</a:t>
+          <a:bodyPr>
+            <a:normAutofit fontScale="90000"/>
+          </a:bodyPr>
+          <a:lstStyle/>
+          <a:p>
+            <a:r>
+              <a:rPr lang="en-US" dirty="0" smtClean="0"/>
+              <a:t>Moore’s (</a:t>
+            </a:r>
+            <a:r>
+              <a:rPr lang="en-US" dirty="0" err="1" smtClean="0"/>
+              <a:t>Kryder's</a:t>
+            </a:r>
+            <a:r>
+              <a:rPr lang="en-US" dirty="0" smtClean="0"/>
+              <a:t>) law and genomics</a:t>
             </a:r>
             <a:endParaRPr lang="en-US" dirty="0"/>
           </a:p>
@@ -5390,11 +5364,7 @@
           <a:p>
             <a:r>
               <a:rPr lang="en-US" dirty="0" smtClean="0"/>
-              <a:t>If we can subdivide ou</a:t>
-            </a:r>
-            <a:r>
-              <a:rPr lang="en-US" dirty="0" smtClean="0"/>
-              <a:t>r problem into independent </a:t>
+              <a:t>If we can subdivide our problem into independent </a:t>
             </a:r>
             <a:r>
               <a:rPr lang="en-US" dirty="0" err="1" smtClean="0"/>

</xml_diff>

<commit_message>
more exercise more sensible
</commit_message>
<xml_diff>
--- a/doc/slides/day3/session3/Parallelization.pptx
+++ b/doc/slides/day3/session3/Parallelization.pptx
@@ -3906,6 +3906,13 @@
   <p:clrMapOvr>
     <a:masterClrMapping/>
   </p:clrMapOvr>
+  <p:timing>
+    <p:tnLst>
+      <p:par>
+        <p:cTn id="1" dur="indefinite" restart="never" nodeType="tmRoot"/>
+      </p:par>
+    </p:tnLst>
+  </p:timing>
 </p:sld>
 </file>
 
@@ -4027,6 +4034,13 @@
   <p:clrMapOvr>
     <a:masterClrMapping/>
   </p:clrMapOvr>
+  <p:timing>
+    <p:tnLst>
+      <p:par>
+        <p:cTn id="1" dur="indefinite" restart="never" nodeType="tmRoot"/>
+      </p:par>
+    </p:tnLst>
+  </p:timing>
 </p:sld>
 </file>
 
@@ -4188,6 +4202,13 @@
   <p:clrMapOvr>
     <a:masterClrMapping/>
   </p:clrMapOvr>
+  <p:timing>
+    <p:tnLst>
+      <p:par>
+        <p:cTn id="1" dur="indefinite" restart="never" nodeType="tmRoot"/>
+      </p:par>
+    </p:tnLst>
+  </p:timing>
 </p:sld>
 </file>
 
@@ -4431,6 +4452,13 @@
   <p:clrMapOvr>
     <a:masterClrMapping/>
   </p:clrMapOvr>
+  <p:timing>
+    <p:tnLst>
+      <p:par>
+        <p:cTn id="1" dur="indefinite" restart="never" nodeType="tmRoot"/>
+      </p:par>
+    </p:tnLst>
+  </p:timing>
 </p:sld>
 </file>
 
@@ -5043,6 +5071,13 @@
   <p:clrMapOvr>
     <a:masterClrMapping/>
   </p:clrMapOvr>
+  <p:timing>
+    <p:tnLst>
+      <p:par>
+        <p:cTn id="1" dur="indefinite" restart="never" nodeType="tmRoot"/>
+      </p:par>
+    </p:tnLst>
+  </p:timing>
 </p:sld>
 </file>
 
@@ -5156,6 +5191,13 @@
   <p:clrMapOvr>
     <a:masterClrMapping/>
   </p:clrMapOvr>
+  <p:timing>
+    <p:tnLst>
+      <p:par>
+        <p:cTn id="1" dur="indefinite" restart="never" nodeType="tmRoot"/>
+      </p:par>
+    </p:tnLst>
+  </p:timing>
 </p:sld>
 </file>
 
@@ -5376,6 +5418,13 @@
   <p:clrMapOvr>
     <a:masterClrMapping/>
   </p:clrMapOvr>
+  <p:timing>
+    <p:tnLst>
+      <p:par>
+        <p:cTn id="1" dur="indefinite" restart="never" nodeType="tmRoot"/>
+      </p:par>
+    </p:tnLst>
+  </p:timing>
 </p:sld>
 </file>
 
@@ -5483,6 +5532,13 @@
   <p:clrMapOvr>
     <a:masterClrMapping/>
   </p:clrMapOvr>
+  <p:timing>
+    <p:tnLst>
+      <p:par>
+        <p:cTn id="1" dur="indefinite" restart="never" nodeType="tmRoot"/>
+      </p:par>
+    </p:tnLst>
+  </p:timing>
 </p:sld>
 </file>
 
@@ -5572,6 +5628,13 @@
   <p:clrMapOvr>
     <a:masterClrMapping/>
   </p:clrMapOvr>
+  <p:timing>
+    <p:tnLst>
+      <p:par>
+        <p:cTn id="1" dur="indefinite" restart="never" nodeType="tmRoot"/>
+      </p:par>
+    </p:tnLst>
+  </p:timing>
 </p:sld>
 </file>
 
@@ -5936,8 +5999,12 @@
               <a:buNone/>
             </a:pPr>
             <a:r>
-              <a:rPr lang="en-US" dirty="0" smtClean="0"/>
-              <a:t>	touch $@</a:t>
+              <a:rPr lang="en-US" smtClean="0"/>
+              <a:t>	sleep 3 &amp;&amp; touch </a:t>
+            </a:r>
+            <a:r>
+              <a:rPr lang="en-US" dirty="0" smtClean="0"/>
+              <a:t>$@</a:t>
             </a:r>
           </a:p>
           <a:p>
@@ -6049,6 +6116,13 @@
   <p:clrMapOvr>
     <a:masterClrMapping/>
   </p:clrMapOvr>
+  <p:timing>
+    <p:tnLst>
+      <p:par>
+        <p:cTn id="1" dur="indefinite" restart="never" nodeType="tmRoot"/>
+      </p:par>
+    </p:tnLst>
+  </p:timing>
 </p:sld>
 </file>
 

</xml_diff>